<commit_message>
Add: new window icon
</commit_message>
<xml_diff>
--- a/alternative_design/pptx/alt_splash_image.pptx
+++ b/alternative_design/pptx/alt_splash_image.pptx
@@ -6,6 +6,7 @@
   </p:sldMasterIdLst>
   <p:sldIdLst>
     <p:sldId id="256" r:id="rId2"/>
+    <p:sldId id="257" r:id="rId3"/>
   </p:sldIdLst>
   <p:sldSz cx="12192000" cy="6858000"/>
   <p:notesSz cx="6858000" cy="9144000"/>
@@ -104,6 +105,11 @@
       </a:defRPr>
     </a:lvl9pPr>
   </p:defaultTextStyle>
+  <p:extLst>
+    <p:ext uri="{EFAFB233-063F-42B5-8137-9DF3F51BA10A}">
+      <p15:sldGuideLst xmlns:p15="http://schemas.microsoft.com/office/powerpoint/2012/main"/>
+    </p:ext>
+  </p:extLst>
 </p:presentation>
 </file>
 
@@ -254,7 +260,7 @@
           <a:p>
             <a:fld id="{6EF4F590-2C9C-4156-9CA7-265ED7980D4E}" type="datetimeFigureOut">
               <a:rPr lang="en-GB" smtClean="0"/>
-              <a:t>09/01/2025</a:t>
+              <a:t>10/01/2025</a:t>
             </a:fld>
             <a:endParaRPr lang="en-GB"/>
           </a:p>
@@ -452,7 +458,7 @@
           <a:p>
             <a:fld id="{6EF4F590-2C9C-4156-9CA7-265ED7980D4E}" type="datetimeFigureOut">
               <a:rPr lang="en-GB" smtClean="0"/>
-              <a:t>09/01/2025</a:t>
+              <a:t>10/01/2025</a:t>
             </a:fld>
             <a:endParaRPr lang="en-GB"/>
           </a:p>
@@ -660,7 +666,7 @@
           <a:p>
             <a:fld id="{6EF4F590-2C9C-4156-9CA7-265ED7980D4E}" type="datetimeFigureOut">
               <a:rPr lang="en-GB" smtClean="0"/>
-              <a:t>09/01/2025</a:t>
+              <a:t>10/01/2025</a:t>
             </a:fld>
             <a:endParaRPr lang="en-GB"/>
           </a:p>
@@ -858,7 +864,7 @@
           <a:p>
             <a:fld id="{6EF4F590-2C9C-4156-9CA7-265ED7980D4E}" type="datetimeFigureOut">
               <a:rPr lang="en-GB" smtClean="0"/>
-              <a:t>09/01/2025</a:t>
+              <a:t>10/01/2025</a:t>
             </a:fld>
             <a:endParaRPr lang="en-GB"/>
           </a:p>
@@ -1133,7 +1139,7 @@
           <a:p>
             <a:fld id="{6EF4F590-2C9C-4156-9CA7-265ED7980D4E}" type="datetimeFigureOut">
               <a:rPr lang="en-GB" smtClean="0"/>
-              <a:t>09/01/2025</a:t>
+              <a:t>10/01/2025</a:t>
             </a:fld>
             <a:endParaRPr lang="en-GB"/>
           </a:p>
@@ -1398,7 +1404,7 @@
           <a:p>
             <a:fld id="{6EF4F590-2C9C-4156-9CA7-265ED7980D4E}" type="datetimeFigureOut">
               <a:rPr lang="en-GB" smtClean="0"/>
-              <a:t>09/01/2025</a:t>
+              <a:t>10/01/2025</a:t>
             </a:fld>
             <a:endParaRPr lang="en-GB"/>
           </a:p>
@@ -1810,7 +1816,7 @@
           <a:p>
             <a:fld id="{6EF4F590-2C9C-4156-9CA7-265ED7980D4E}" type="datetimeFigureOut">
               <a:rPr lang="en-GB" smtClean="0"/>
-              <a:t>09/01/2025</a:t>
+              <a:t>10/01/2025</a:t>
             </a:fld>
             <a:endParaRPr lang="en-GB"/>
           </a:p>
@@ -1951,7 +1957,7 @@
           <a:p>
             <a:fld id="{6EF4F590-2C9C-4156-9CA7-265ED7980D4E}" type="datetimeFigureOut">
               <a:rPr lang="en-GB" smtClean="0"/>
-              <a:t>09/01/2025</a:t>
+              <a:t>10/01/2025</a:t>
             </a:fld>
             <a:endParaRPr lang="en-GB"/>
           </a:p>
@@ -2064,7 +2070,7 @@
           <a:p>
             <a:fld id="{6EF4F590-2C9C-4156-9CA7-265ED7980D4E}" type="datetimeFigureOut">
               <a:rPr lang="en-GB" smtClean="0"/>
-              <a:t>09/01/2025</a:t>
+              <a:t>10/01/2025</a:t>
             </a:fld>
             <a:endParaRPr lang="en-GB"/>
           </a:p>
@@ -2375,7 +2381,7 @@
           <a:p>
             <a:fld id="{6EF4F590-2C9C-4156-9CA7-265ED7980D4E}" type="datetimeFigureOut">
               <a:rPr lang="en-GB" smtClean="0"/>
-              <a:t>09/01/2025</a:t>
+              <a:t>10/01/2025</a:t>
             </a:fld>
             <a:endParaRPr lang="en-GB"/>
           </a:p>
@@ -2663,7 +2669,7 @@
           <a:p>
             <a:fld id="{6EF4F590-2C9C-4156-9CA7-265ED7980D4E}" type="datetimeFigureOut">
               <a:rPr lang="en-GB" smtClean="0"/>
-              <a:t>09/01/2025</a:t>
+              <a:t>10/01/2025</a:t>
             </a:fld>
             <a:endParaRPr lang="en-GB"/>
           </a:p>
@@ -2904,7 +2910,7 @@
           <a:p>
             <a:fld id="{6EF4F590-2C9C-4156-9CA7-265ED7980D4E}" type="datetimeFigureOut">
               <a:rPr lang="en-GB" smtClean="0"/>
-              <a:t>09/01/2025</a:t>
+              <a:t>10/01/2025</a:t>
             </a:fld>
             <a:endParaRPr lang="en-GB"/>
           </a:p>
@@ -3601,6 +3607,362 @@
 </p:sld>
 </file>
 
+<file path=ppt/slides/slide2.xml><?xml version="1.0" encoding="utf-8"?>
+<p:sld xmlns:a="http://schemas.openxmlformats.org/drawingml/2006/main" xmlns:r="http://schemas.openxmlformats.org/officeDocument/2006/relationships" xmlns:p="http://schemas.openxmlformats.org/presentationml/2006/main">
+  <p:cSld>
+    <p:spTree>
+      <p:nvGrpSpPr>
+        <p:cNvPr id="1" name="">
+          <a:extLst>
+            <a:ext uri="{FF2B5EF4-FFF2-40B4-BE49-F238E27FC236}">
+              <a16:creationId xmlns:a16="http://schemas.microsoft.com/office/drawing/2014/main" id="{3C5BBD61-E768-AC1D-55A6-5CB502A5E9E4}"/>
+            </a:ext>
+          </a:extLst>
+        </p:cNvPr>
+        <p:cNvGrpSpPr/>
+        <p:nvPr/>
+      </p:nvGrpSpPr>
+      <p:grpSpPr>
+        <a:xfrm>
+          <a:off x="0" y="0"/>
+          <a:ext cx="0" cy="0"/>
+          <a:chOff x="0" y="0"/>
+          <a:chExt cx="0" cy="0"/>
+        </a:xfrm>
+      </p:grpSpPr>
+      <p:pic>
+        <p:nvPicPr>
+          <p:cNvPr id="5" name="Picture 4">
+            <a:extLst>
+              <a:ext uri="{FF2B5EF4-FFF2-40B4-BE49-F238E27FC236}">
+                <a16:creationId xmlns:a16="http://schemas.microsoft.com/office/drawing/2014/main" id="{7DAE3CC0-04B2-D055-CD9D-987359C6D164}"/>
+              </a:ext>
+            </a:extLst>
+          </p:cNvPr>
+          <p:cNvPicPr>
+            <a:picLocks noChangeAspect="1"/>
+          </p:cNvPicPr>
+          <p:nvPr/>
+        </p:nvPicPr>
+        <p:blipFill>
+          <a:blip r:embed="rId2">
+            <a:duotone>
+              <a:schemeClr val="bg2">
+                <a:shade val="45000"/>
+                <a:satMod val="135000"/>
+              </a:schemeClr>
+              <a:prstClr val="white"/>
+            </a:duotone>
+            <a:extLst>
+              <a:ext uri="{BEBA8EAE-BF5A-486C-A8C5-ECC9F3942E4B}">
+                <a14:imgProps xmlns:a14="http://schemas.microsoft.com/office/drawing/2010/main">
+                  <a14:imgLayer r:embed="rId3">
+                    <a14:imgEffect>
+                      <a14:backgroundRemoval t="7985" b="93790" l="5488" r="95808">
+                        <a14:foregroundMark x1="8841" y1="48289" x2="8841" y2="48289"/>
+                        <a14:foregroundMark x1="5640" y1="49176" x2="5640" y2="49176"/>
+                        <a14:foregroundMark x1="37348" y1="7985" x2="37348" y2="7985"/>
+                        <a14:foregroundMark x1="92378" y1="33587" x2="92378" y2="33587"/>
+                        <a14:foregroundMark x1="95655" y1="56147" x2="95655" y2="56147"/>
+                        <a14:foregroundMark x1="95808" y1="69708" x2="95808" y2="69708"/>
+                        <a14:foregroundMark x1="70884" y1="91635" x2="70884" y2="91635"/>
+                        <a14:foregroundMark x1="25991" y1="93029" x2="25991" y2="93029"/>
+                        <a14:foregroundMark x1="31631" y1="93156" x2="31631" y2="93156"/>
+                        <a14:foregroundMark x1="68826" y1="93790" x2="68826" y2="93790"/>
+                      </a14:backgroundRemoval>
+                    </a14:imgEffect>
+                    <a14:imgEffect>
+                      <a14:colorTemperature colorTemp="8800"/>
+                    </a14:imgEffect>
+                    <a14:imgEffect>
+                      <a14:saturation sat="0"/>
+                    </a14:imgEffect>
+                  </a14:imgLayer>
+                </a14:imgProps>
+              </a:ext>
+            </a:extLst>
+          </a:blip>
+          <a:stretch>
+            <a:fillRect/>
+          </a:stretch>
+        </p:blipFill>
+        <p:spPr>
+          <a:xfrm>
+            <a:off x="669026" y="165370"/>
+            <a:ext cx="10853948" cy="6527260"/>
+          </a:xfrm>
+          <a:prstGeom prst="rect">
+            <a:avLst/>
+          </a:prstGeom>
+          <a:ln>
+            <a:noFill/>
+          </a:ln>
+          <a:effectLst>
+            <a:outerShdw blurRad="292100" dist="139700" dir="2700000" algn="tl" rotWithShape="0">
+              <a:srgbClr val="333333">
+                <a:alpha val="65000"/>
+              </a:srgbClr>
+            </a:outerShdw>
+          </a:effectLst>
+        </p:spPr>
+      </p:pic>
+      <p:sp>
+        <p:nvSpPr>
+          <p:cNvPr id="8" name="Rectangle: Rounded Corners 7">
+            <a:extLst>
+              <a:ext uri="{FF2B5EF4-FFF2-40B4-BE49-F238E27FC236}">
+                <a16:creationId xmlns:a16="http://schemas.microsoft.com/office/drawing/2014/main" id="{EB78A2BC-976B-89E1-2E55-48B447C4DF19}"/>
+              </a:ext>
+            </a:extLst>
+          </p:cNvPr>
+          <p:cNvSpPr/>
+          <p:nvPr/>
+        </p:nvSpPr>
+        <p:spPr>
+          <a:xfrm>
+            <a:off x="2456647" y="1528179"/>
+            <a:ext cx="7278706" cy="330923"/>
+          </a:xfrm>
+          <a:prstGeom prst="roundRect">
+            <a:avLst>
+              <a:gd name="adj" fmla="val 8334"/>
+            </a:avLst>
+          </a:prstGeom>
+          <a:solidFill>
+            <a:srgbClr val="990033"/>
+          </a:solidFill>
+          <a:ln>
+            <a:noFill/>
+          </a:ln>
+          <a:effectLst>
+            <a:outerShdw blurRad="50800" dist="38100" dir="2700000" algn="tl" rotWithShape="0">
+              <a:prstClr val="black">
+                <a:alpha val="40000"/>
+              </a:prstClr>
+            </a:outerShdw>
+          </a:effectLst>
+        </p:spPr>
+        <p:style>
+          <a:lnRef idx="2">
+            <a:schemeClr val="accent1">
+              <a:shade val="15000"/>
+            </a:schemeClr>
+          </a:lnRef>
+          <a:fillRef idx="1">
+            <a:schemeClr val="accent1"/>
+          </a:fillRef>
+          <a:effectRef idx="0">
+            <a:schemeClr val="accent1"/>
+          </a:effectRef>
+          <a:fontRef idx="minor">
+            <a:schemeClr val="lt1"/>
+          </a:fontRef>
+        </p:style>
+        <p:txBody>
+          <a:bodyPr rtlCol="0" anchor="ctr"/>
+          <a:lstStyle/>
+          <a:p>
+            <a:pPr algn="ctr"/>
+            <a:r>
+              <a:rPr lang="en-US" sz="1600" dirty="0"/>
+              <a:t>Initially developed by Warren L. DeLano and now maintained by Schrödinger LLC.</a:t>
+            </a:r>
+          </a:p>
+        </p:txBody>
+      </p:sp>
+      <p:sp>
+        <p:nvSpPr>
+          <p:cNvPr id="3" name="TextBox 2">
+            <a:extLst>
+              <a:ext uri="{FF2B5EF4-FFF2-40B4-BE49-F238E27FC236}">
+                <a16:creationId xmlns:a16="http://schemas.microsoft.com/office/drawing/2014/main" id="{B9FE6F42-E580-CBEB-9BFE-CD9AED537E9F}"/>
+              </a:ext>
+            </a:extLst>
+          </p:cNvPr>
+          <p:cNvSpPr txBox="1"/>
+          <p:nvPr/>
+        </p:nvSpPr>
+        <p:spPr>
+          <a:xfrm>
+            <a:off x="2813116" y="630953"/>
+            <a:ext cx="6565768" cy="523220"/>
+          </a:xfrm>
+          <a:prstGeom prst="rect">
+            <a:avLst/>
+          </a:prstGeom>
+          <a:noFill/>
+        </p:spPr>
+        <p:txBody>
+          <a:bodyPr wrap="square">
+            <a:spAutoFit/>
+          </a:bodyPr>
+          <a:lstStyle/>
+          <a:p>
+            <a:pPr algn="ctr"/>
+            <a:r>
+              <a:rPr lang="de-DE" sz="2800" b="1" dirty="0"/>
+              <a:t>Open-Source PyMOL™</a:t>
+            </a:r>
+            <a:endParaRPr lang="de-DE" b="1" dirty="0"/>
+          </a:p>
+        </p:txBody>
+      </p:sp>
+      <p:sp>
+        <p:nvSpPr>
+          <p:cNvPr id="9" name="TextBox 8">
+            <a:extLst>
+              <a:ext uri="{FF2B5EF4-FFF2-40B4-BE49-F238E27FC236}">
+                <a16:creationId xmlns:a16="http://schemas.microsoft.com/office/drawing/2014/main" id="{35BCD76E-2BE7-6CC6-8677-7E1ED03A235F}"/>
+              </a:ext>
+            </a:extLst>
+          </p:cNvPr>
+          <p:cNvSpPr txBox="1"/>
+          <p:nvPr/>
+        </p:nvSpPr>
+        <p:spPr>
+          <a:xfrm>
+            <a:off x="2456648" y="1116375"/>
+            <a:ext cx="7278705" cy="369332"/>
+          </a:xfrm>
+          <a:prstGeom prst="rect">
+            <a:avLst/>
+          </a:prstGeom>
+          <a:noFill/>
+        </p:spPr>
+        <p:txBody>
+          <a:bodyPr wrap="square">
+            <a:spAutoFit/>
+          </a:bodyPr>
+          <a:lstStyle/>
+          <a:p>
+            <a:pPr algn="ctr"/>
+            <a:r>
+              <a:rPr lang="en-US" sz="1800" dirty="0"/>
+              <a:t>Unofficial Windows PyMOL™ Executable – Copyright © Schrödinger, LLC</a:t>
+            </a:r>
+          </a:p>
+        </p:txBody>
+      </p:sp>
+      <p:sp>
+        <p:nvSpPr>
+          <p:cNvPr id="11" name="TextBox 10">
+            <a:extLst>
+              <a:ext uri="{FF2B5EF4-FFF2-40B4-BE49-F238E27FC236}">
+                <a16:creationId xmlns:a16="http://schemas.microsoft.com/office/drawing/2014/main" id="{5F3A0310-75DD-ADD9-AC97-73E0AA633694}"/>
+              </a:ext>
+            </a:extLst>
+          </p:cNvPr>
+          <p:cNvSpPr txBox="1"/>
+          <p:nvPr/>
+        </p:nvSpPr>
+        <p:spPr>
+          <a:xfrm>
+            <a:off x="2242400" y="5013897"/>
+            <a:ext cx="7707197" cy="646331"/>
+          </a:xfrm>
+          <a:prstGeom prst="rect">
+            <a:avLst/>
+          </a:prstGeom>
+          <a:noFill/>
+        </p:spPr>
+        <p:txBody>
+          <a:bodyPr wrap="square">
+            <a:spAutoFit/>
+          </a:bodyPr>
+          <a:lstStyle/>
+          <a:p>
+            <a:pPr algn="ctr"/>
+            <a:r>
+              <a:rPr lang="en-US" dirty="0"/>
+              <a:t>NOTICE: </a:t>
+            </a:r>
+            <a:r>
+              <a:rPr lang="en-US" sz="1800" dirty="0"/>
+              <a:t>To obtain the official incentive PyMOL executables with maintenance and support, visit https://www.pymol.org/</a:t>
+            </a:r>
+          </a:p>
+        </p:txBody>
+      </p:sp>
+      <p:sp>
+        <p:nvSpPr>
+          <p:cNvPr id="12" name="TextBox 11">
+            <a:extLst>
+              <a:ext uri="{FF2B5EF4-FFF2-40B4-BE49-F238E27FC236}">
+                <a16:creationId xmlns:a16="http://schemas.microsoft.com/office/drawing/2014/main" id="{C7BB91FA-B065-C933-B1B6-8FC1BE9E8A38}"/>
+              </a:ext>
+            </a:extLst>
+          </p:cNvPr>
+          <p:cNvSpPr txBox="1"/>
+          <p:nvPr/>
+        </p:nvSpPr>
+        <p:spPr>
+          <a:xfrm>
+            <a:off x="2242401" y="2227170"/>
+            <a:ext cx="7707197" cy="1754326"/>
+          </a:xfrm>
+          <a:prstGeom prst="rect">
+            <a:avLst/>
+          </a:prstGeom>
+          <a:noFill/>
+        </p:spPr>
+        <p:txBody>
+          <a:bodyPr wrap="square">
+            <a:spAutoFit/>
+          </a:bodyPr>
+          <a:lstStyle/>
+          <a:p>
+            <a:pPr algn="ctr"/>
+            <a:r>
+              <a:rPr lang="en-US" dirty="0"/>
+              <a:t>This is a custom PyMOL Executable Build for the Windows operating system. </a:t>
+            </a:r>
+          </a:p>
+          <a:p>
+            <a:pPr algn="ctr"/>
+            <a:r>
+              <a:rPr lang="en-US" dirty="0"/>
+              <a:t>PyMOL was </a:t>
+            </a:r>
+            <a:r>
+              <a:rPr lang="en-US" sz="1800" dirty="0"/>
+              <a:t>initially </a:t>
+            </a:r>
+            <a:r>
+              <a:rPr lang="en-US" dirty="0"/>
+              <a:t>a project by Warren L. DeLano and mainly </a:t>
+            </a:r>
+            <a:r>
+              <a:rPr lang="en-US" sz="1800" dirty="0"/>
+              <a:t>developed by DeLano Scientific LLC and is now maintained by Schrödinger LLC.</a:t>
+            </a:r>
+          </a:p>
+          <a:p>
+            <a:pPr algn="ctr"/>
+            <a:endParaRPr lang="en-GB" dirty="0"/>
+          </a:p>
+          <a:p>
+            <a:pPr algn="ctr"/>
+            <a:r>
+              <a:rPr lang="en-GB" dirty="0"/>
+              <a:t>Many thanks to all the developers and especially to Warren for giving the world a free and open-source software to visualize the molecular world.</a:t>
+            </a:r>
+            <a:endParaRPr lang="en-US" sz="1800" dirty="0"/>
+          </a:p>
+        </p:txBody>
+      </p:sp>
+    </p:spTree>
+    <p:extLst>
+      <p:ext uri="{BB962C8B-B14F-4D97-AF65-F5344CB8AC3E}">
+        <p14:creationId xmlns:p14="http://schemas.microsoft.com/office/powerpoint/2010/main" val="4005464352"/>
+      </p:ext>
+    </p:extLst>
+  </p:cSld>
+  <p:clrMapOvr>
+    <a:masterClrMapping/>
+  </p:clrMapOvr>
+</p:sld>
+</file>
+
 <file path=ppt/theme/theme1.xml><?xml version="1.0" encoding="utf-8"?>
 <a:theme xmlns:a="http://schemas.openxmlformats.org/drawingml/2006/main" name="Office Theme">
   <a:themeElements>

</xml_diff>

<commit_message>
Add: python includes & Update: README.md
</commit_message>
<xml_diff>
--- a/alternative_design/pptx/alt_splash_image.pptx
+++ b/alternative_design/pptx/alt_splash_image.pptx
@@ -7,6 +7,7 @@
   <p:sldIdLst>
     <p:sldId id="256" r:id="rId2"/>
     <p:sldId id="257" r:id="rId3"/>
+    <p:sldId id="258" r:id="rId4"/>
   </p:sldIdLst>
   <p:sldSz cx="12192000" cy="6858000"/>
   <p:notesSz cx="6858000" cy="9144000"/>
@@ -260,7 +261,7 @@
           <a:p>
             <a:fld id="{6EF4F590-2C9C-4156-9CA7-265ED7980D4E}" type="datetimeFigureOut">
               <a:rPr lang="en-GB" smtClean="0"/>
-              <a:t>10/01/2025</a:t>
+              <a:t>12/01/2025</a:t>
             </a:fld>
             <a:endParaRPr lang="en-GB"/>
           </a:p>
@@ -458,7 +459,7 @@
           <a:p>
             <a:fld id="{6EF4F590-2C9C-4156-9CA7-265ED7980D4E}" type="datetimeFigureOut">
               <a:rPr lang="en-GB" smtClean="0"/>
-              <a:t>10/01/2025</a:t>
+              <a:t>12/01/2025</a:t>
             </a:fld>
             <a:endParaRPr lang="en-GB"/>
           </a:p>
@@ -666,7 +667,7 @@
           <a:p>
             <a:fld id="{6EF4F590-2C9C-4156-9CA7-265ED7980D4E}" type="datetimeFigureOut">
               <a:rPr lang="en-GB" smtClean="0"/>
-              <a:t>10/01/2025</a:t>
+              <a:t>12/01/2025</a:t>
             </a:fld>
             <a:endParaRPr lang="en-GB"/>
           </a:p>
@@ -864,7 +865,7 @@
           <a:p>
             <a:fld id="{6EF4F590-2C9C-4156-9CA7-265ED7980D4E}" type="datetimeFigureOut">
               <a:rPr lang="en-GB" smtClean="0"/>
-              <a:t>10/01/2025</a:t>
+              <a:t>12/01/2025</a:t>
             </a:fld>
             <a:endParaRPr lang="en-GB"/>
           </a:p>
@@ -1139,7 +1140,7 @@
           <a:p>
             <a:fld id="{6EF4F590-2C9C-4156-9CA7-265ED7980D4E}" type="datetimeFigureOut">
               <a:rPr lang="en-GB" smtClean="0"/>
-              <a:t>10/01/2025</a:t>
+              <a:t>12/01/2025</a:t>
             </a:fld>
             <a:endParaRPr lang="en-GB"/>
           </a:p>
@@ -1404,7 +1405,7 @@
           <a:p>
             <a:fld id="{6EF4F590-2C9C-4156-9CA7-265ED7980D4E}" type="datetimeFigureOut">
               <a:rPr lang="en-GB" smtClean="0"/>
-              <a:t>10/01/2025</a:t>
+              <a:t>12/01/2025</a:t>
             </a:fld>
             <a:endParaRPr lang="en-GB"/>
           </a:p>
@@ -1816,7 +1817,7 @@
           <a:p>
             <a:fld id="{6EF4F590-2C9C-4156-9CA7-265ED7980D4E}" type="datetimeFigureOut">
               <a:rPr lang="en-GB" smtClean="0"/>
-              <a:t>10/01/2025</a:t>
+              <a:t>12/01/2025</a:t>
             </a:fld>
             <a:endParaRPr lang="en-GB"/>
           </a:p>
@@ -1957,7 +1958,7 @@
           <a:p>
             <a:fld id="{6EF4F590-2C9C-4156-9CA7-265ED7980D4E}" type="datetimeFigureOut">
               <a:rPr lang="en-GB" smtClean="0"/>
-              <a:t>10/01/2025</a:t>
+              <a:t>12/01/2025</a:t>
             </a:fld>
             <a:endParaRPr lang="en-GB"/>
           </a:p>
@@ -2070,7 +2071,7 @@
           <a:p>
             <a:fld id="{6EF4F590-2C9C-4156-9CA7-265ED7980D4E}" type="datetimeFigureOut">
               <a:rPr lang="en-GB" smtClean="0"/>
-              <a:t>10/01/2025</a:t>
+              <a:t>12/01/2025</a:t>
             </a:fld>
             <a:endParaRPr lang="en-GB"/>
           </a:p>
@@ -2381,7 +2382,7 @@
           <a:p>
             <a:fld id="{6EF4F590-2C9C-4156-9CA7-265ED7980D4E}" type="datetimeFigureOut">
               <a:rPr lang="en-GB" smtClean="0"/>
-              <a:t>10/01/2025</a:t>
+              <a:t>12/01/2025</a:t>
             </a:fld>
             <a:endParaRPr lang="en-GB"/>
           </a:p>
@@ -2669,7 +2670,7 @@
           <a:p>
             <a:fld id="{6EF4F590-2C9C-4156-9CA7-265ED7980D4E}" type="datetimeFigureOut">
               <a:rPr lang="en-GB" smtClean="0"/>
-              <a:t>10/01/2025</a:t>
+              <a:t>12/01/2025</a:t>
             </a:fld>
             <a:endParaRPr lang="en-GB"/>
           </a:p>
@@ -2910,7 +2911,7 @@
           <a:p>
             <a:fld id="{6EF4F590-2C9C-4156-9CA7-265ED7980D4E}" type="datetimeFigureOut">
               <a:rPr lang="en-GB" smtClean="0"/>
-              <a:t>10/01/2025</a:t>
+              <a:t>12/01/2025</a:t>
             </a:fld>
             <a:endParaRPr lang="en-GB"/>
           </a:p>
@@ -3963,6 +3964,137 @@
 </p:sld>
 </file>
 
+<file path=ppt/slides/slide3.xml><?xml version="1.0" encoding="utf-8"?>
+<p:sld xmlns:a="http://schemas.openxmlformats.org/drawingml/2006/main" xmlns:r="http://schemas.openxmlformats.org/officeDocument/2006/relationships" xmlns:p="http://schemas.openxmlformats.org/presentationml/2006/main">
+  <p:cSld>
+    <p:spTree>
+      <p:nvGrpSpPr>
+        <p:cNvPr id="1" name=""/>
+        <p:cNvGrpSpPr/>
+        <p:nvPr/>
+      </p:nvGrpSpPr>
+      <p:grpSpPr>
+        <a:xfrm>
+          <a:off x="0" y="0"/>
+          <a:ext cx="0" cy="0"/>
+          <a:chOff x="0" y="0"/>
+          <a:chExt cx="0" cy="0"/>
+        </a:xfrm>
+      </p:grpSpPr>
+      <p:pic>
+        <p:nvPicPr>
+          <p:cNvPr id="7" name="Picture 6" descr="A white background with black and white clouds&#10;&#10;Description automatically generated with medium confidence">
+            <a:extLst>
+              <a:ext uri="{FF2B5EF4-FFF2-40B4-BE49-F238E27FC236}">
+                <a16:creationId xmlns:a16="http://schemas.microsoft.com/office/drawing/2014/main" id="{87C449FC-C1AE-D1FB-490D-7D24439DB3B2}"/>
+              </a:ext>
+            </a:extLst>
+          </p:cNvPr>
+          <p:cNvPicPr>
+            <a:picLocks noChangeAspect="1"/>
+          </p:cNvPicPr>
+          <p:nvPr/>
+        </p:nvPicPr>
+        <p:blipFill>
+          <a:blip r:embed="rId2">
+            <a:extLst>
+              <a:ext uri="{28A0092B-C50C-407E-A947-70E740481C1C}">
+                <a14:useLocalDpi xmlns:a14="http://schemas.microsoft.com/office/drawing/2010/main" val="0"/>
+              </a:ext>
+            </a:extLst>
+          </a:blip>
+          <a:stretch>
+            <a:fillRect/>
+          </a:stretch>
+        </p:blipFill>
+        <p:spPr>
+          <a:xfrm>
+            <a:off x="4952840" y="1242707"/>
+            <a:ext cx="2286319" cy="4372585"/>
+          </a:xfrm>
+          <a:prstGeom prst="rect">
+            <a:avLst/>
+          </a:prstGeom>
+        </p:spPr>
+      </p:pic>
+      <p:sp>
+        <p:nvSpPr>
+          <p:cNvPr id="8" name="Rectangle: Rounded Corners 7">
+            <a:extLst>
+              <a:ext uri="{FF2B5EF4-FFF2-40B4-BE49-F238E27FC236}">
+                <a16:creationId xmlns:a16="http://schemas.microsoft.com/office/drawing/2014/main" id="{8A03CF08-FFAD-EA72-12D9-2CD55A382243}"/>
+              </a:ext>
+            </a:extLst>
+          </p:cNvPr>
+          <p:cNvSpPr/>
+          <p:nvPr/>
+        </p:nvSpPr>
+        <p:spPr>
+          <a:xfrm>
+            <a:off x="4997450" y="1292716"/>
+            <a:ext cx="2178050" cy="837907"/>
+          </a:xfrm>
+          <a:prstGeom prst="roundRect">
+            <a:avLst>
+              <a:gd name="adj" fmla="val 8334"/>
+            </a:avLst>
+          </a:prstGeom>
+          <a:solidFill>
+            <a:srgbClr val="990033"/>
+          </a:solidFill>
+          <a:ln>
+            <a:noFill/>
+          </a:ln>
+          <a:effectLst>
+            <a:outerShdw blurRad="50800" dist="38100" dir="2700000" algn="tl" rotWithShape="0">
+              <a:prstClr val="black">
+                <a:alpha val="40000"/>
+              </a:prstClr>
+            </a:outerShdw>
+          </a:effectLst>
+        </p:spPr>
+        <p:style>
+          <a:lnRef idx="2">
+            <a:schemeClr val="accent1">
+              <a:shade val="15000"/>
+            </a:schemeClr>
+          </a:lnRef>
+          <a:fillRef idx="1">
+            <a:schemeClr val="accent1"/>
+          </a:fillRef>
+          <a:effectRef idx="0">
+            <a:schemeClr val="accent1"/>
+          </a:effectRef>
+          <a:fontRef idx="minor">
+            <a:schemeClr val="lt1"/>
+          </a:fontRef>
+        </p:style>
+        <p:txBody>
+          <a:bodyPr rtlCol="0" anchor="ctr"/>
+          <a:lstStyle/>
+          <a:p>
+            <a:pPr algn="ctr"/>
+            <a:r>
+              <a:rPr lang="de-DE" b="1" dirty="0"/>
+              <a:t>Open-Source PyMOL™</a:t>
+            </a:r>
+            <a:endParaRPr lang="de-DE" sz="1200" b="1" dirty="0"/>
+          </a:p>
+        </p:txBody>
+      </p:sp>
+    </p:spTree>
+    <p:extLst>
+      <p:ext uri="{BB962C8B-B14F-4D97-AF65-F5344CB8AC3E}">
+        <p14:creationId xmlns:p14="http://schemas.microsoft.com/office/powerpoint/2010/main" val="3604152677"/>
+      </p:ext>
+    </p:extLst>
+  </p:cSld>
+  <p:clrMapOvr>
+    <a:masterClrMapping/>
+  </p:clrMapOvr>
+</p:sld>
+</file>
+
 <file path=ppt/theme/theme1.xml><?xml version="1.0" encoding="utf-8"?>
 <a:theme xmlns:a="http://schemas.openxmlformats.org/drawingml/2006/main" name="Office Theme">
   <a:themeElements>

</xml_diff>